<commit_message>
addition of new lectures
</commit_message>
<xml_diff>
--- a/8_timeseries_analysis_and_forecast/Timeseries and ARIMA.pptx
+++ b/8_timeseries_analysis_and_forecast/Timeseries and ARIMA.pptx
@@ -239,7 +239,7 @@
           <a:p>
             <a:fld id="{4687D29C-3CD1-4809-A946-86914B434806}" type="datetimeFigureOut">
               <a:rPr lang="en-US" smtClean="0"/>
-              <a:t>10/9/2025</a:t>
+              <a:t>10/11/2025</a:t>
             </a:fld>
             <a:endParaRPr lang="en-US" dirty="0"/>
           </a:p>
@@ -745,7 +745,7 @@
           <a:p>
             <a:fld id="{8E96D5F0-40C0-416F-A587-BB51871BF901}" type="slidenum">
               <a:rPr lang="en-US" smtClean="0"/>
-              <a:t>20</a:t>
+              <a:t>15</a:t>
             </a:fld>
             <a:endParaRPr lang="en-US" dirty="0"/>
           </a:p>
@@ -754,7 +754,7 @@
     </p:spTree>
     <p:extLst>
       <p:ext uri="{BB962C8B-B14F-4D97-AF65-F5344CB8AC3E}">
-        <p14:creationId xmlns:p14="http://schemas.microsoft.com/office/powerpoint/2010/main" val="1736120642"/>
+        <p14:creationId xmlns:p14="http://schemas.microsoft.com/office/powerpoint/2010/main" val="1289921410"/>
       </p:ext>
     </p:extLst>
   </p:cSld>
@@ -829,7 +829,7 @@
           <a:p>
             <a:fld id="{8E96D5F0-40C0-416F-A587-BB51871BF901}" type="slidenum">
               <a:rPr lang="en-US" smtClean="0"/>
-              <a:t>23</a:t>
+              <a:t>20</a:t>
             </a:fld>
             <a:endParaRPr lang="en-US" dirty="0"/>
           </a:p>
@@ -838,7 +838,7 @@
     </p:spTree>
     <p:extLst>
       <p:ext uri="{BB962C8B-B14F-4D97-AF65-F5344CB8AC3E}">
-        <p14:creationId xmlns:p14="http://schemas.microsoft.com/office/powerpoint/2010/main" val="1585606390"/>
+        <p14:creationId xmlns:p14="http://schemas.microsoft.com/office/powerpoint/2010/main" val="1736120642"/>
       </p:ext>
     </p:extLst>
   </p:cSld>
@@ -892,6 +892,174 @@
           <a:bodyPr/>
           <a:lstStyle/>
           <a:p>
+            <a:endParaRPr lang="en-US" dirty="0"/>
+          </a:p>
+        </p:txBody>
+      </p:sp>
+      <p:sp>
+        <p:nvSpPr>
+          <p:cNvPr id="4" name="Slide Number Placeholder 3"/>
+          <p:cNvSpPr>
+            <a:spLocks noGrp="1"/>
+          </p:cNvSpPr>
+          <p:nvPr>
+            <p:ph type="sldNum" sz="quarter" idx="10"/>
+          </p:nvPr>
+        </p:nvSpPr>
+        <p:spPr/>
+        <p:txBody>
+          <a:bodyPr/>
+          <a:lstStyle/>
+          <a:p>
+            <a:fld id="{8E96D5F0-40C0-416F-A587-BB51871BF901}" type="slidenum">
+              <a:rPr lang="en-US" smtClean="0"/>
+              <a:t>22</a:t>
+            </a:fld>
+            <a:endParaRPr lang="en-US" dirty="0"/>
+          </a:p>
+        </p:txBody>
+      </p:sp>
+    </p:spTree>
+    <p:extLst>
+      <p:ext uri="{BB962C8B-B14F-4D97-AF65-F5344CB8AC3E}">
+        <p14:creationId xmlns:p14="http://schemas.microsoft.com/office/powerpoint/2010/main" val="1069142437"/>
+      </p:ext>
+    </p:extLst>
+  </p:cSld>
+  <p:clrMapOvr>
+    <a:masterClrMapping/>
+  </p:clrMapOvr>
+</p:notes>
+</file>
+
+<file path=ppt/notesSlides/notesSlide6.xml><?xml version="1.0" encoding="utf-8"?>
+<p:notes xmlns:a="http://schemas.openxmlformats.org/drawingml/2006/main" xmlns:r="http://schemas.openxmlformats.org/officeDocument/2006/relationships" xmlns:p="http://schemas.openxmlformats.org/presentationml/2006/main">
+  <p:cSld>
+    <p:spTree>
+      <p:nvGrpSpPr>
+        <p:cNvPr id="1" name=""/>
+        <p:cNvGrpSpPr/>
+        <p:nvPr/>
+      </p:nvGrpSpPr>
+      <p:grpSpPr>
+        <a:xfrm>
+          <a:off x="0" y="0"/>
+          <a:ext cx="0" cy="0"/>
+          <a:chOff x="0" y="0"/>
+          <a:chExt cx="0" cy="0"/>
+        </a:xfrm>
+      </p:grpSpPr>
+      <p:sp>
+        <p:nvSpPr>
+          <p:cNvPr id="2" name="Slide Image Placeholder 1"/>
+          <p:cNvSpPr>
+            <a:spLocks noGrp="1" noRot="1" noChangeAspect="1"/>
+          </p:cNvSpPr>
+          <p:nvPr>
+            <p:ph type="sldImg"/>
+          </p:nvPr>
+        </p:nvSpPr>
+        <p:spPr/>
+      </p:sp>
+      <p:sp>
+        <p:nvSpPr>
+          <p:cNvPr id="3" name="Notes Placeholder 2"/>
+          <p:cNvSpPr>
+            <a:spLocks noGrp="1"/>
+          </p:cNvSpPr>
+          <p:nvPr>
+            <p:ph type="body" idx="1"/>
+          </p:nvPr>
+        </p:nvSpPr>
+        <p:spPr/>
+        <p:txBody>
+          <a:bodyPr/>
+          <a:lstStyle/>
+          <a:p>
+            <a:endParaRPr lang="en-US" dirty="0"/>
+          </a:p>
+        </p:txBody>
+      </p:sp>
+      <p:sp>
+        <p:nvSpPr>
+          <p:cNvPr id="4" name="Slide Number Placeholder 3"/>
+          <p:cNvSpPr>
+            <a:spLocks noGrp="1"/>
+          </p:cNvSpPr>
+          <p:nvPr>
+            <p:ph type="sldNum" sz="quarter" idx="10"/>
+          </p:nvPr>
+        </p:nvSpPr>
+        <p:spPr/>
+        <p:txBody>
+          <a:bodyPr/>
+          <a:lstStyle/>
+          <a:p>
+            <a:fld id="{8E96D5F0-40C0-416F-A587-BB51871BF901}" type="slidenum">
+              <a:rPr lang="en-US" smtClean="0"/>
+              <a:t>23</a:t>
+            </a:fld>
+            <a:endParaRPr lang="en-US" dirty="0"/>
+          </a:p>
+        </p:txBody>
+      </p:sp>
+    </p:spTree>
+    <p:extLst>
+      <p:ext uri="{BB962C8B-B14F-4D97-AF65-F5344CB8AC3E}">
+        <p14:creationId xmlns:p14="http://schemas.microsoft.com/office/powerpoint/2010/main" val="1585606390"/>
+      </p:ext>
+    </p:extLst>
+  </p:cSld>
+  <p:clrMapOvr>
+    <a:masterClrMapping/>
+  </p:clrMapOvr>
+</p:notes>
+</file>
+
+<file path=ppt/notesSlides/notesSlide7.xml><?xml version="1.0" encoding="utf-8"?>
+<p:notes xmlns:a="http://schemas.openxmlformats.org/drawingml/2006/main" xmlns:r="http://schemas.openxmlformats.org/officeDocument/2006/relationships" xmlns:p="http://schemas.openxmlformats.org/presentationml/2006/main">
+  <p:cSld>
+    <p:spTree>
+      <p:nvGrpSpPr>
+        <p:cNvPr id="1" name=""/>
+        <p:cNvGrpSpPr/>
+        <p:nvPr/>
+      </p:nvGrpSpPr>
+      <p:grpSpPr>
+        <a:xfrm>
+          <a:off x="0" y="0"/>
+          <a:ext cx="0" cy="0"/>
+          <a:chOff x="0" y="0"/>
+          <a:chExt cx="0" cy="0"/>
+        </a:xfrm>
+      </p:grpSpPr>
+      <p:sp>
+        <p:nvSpPr>
+          <p:cNvPr id="2" name="Slide Image Placeholder 1"/>
+          <p:cNvSpPr>
+            <a:spLocks noGrp="1" noRot="1" noChangeAspect="1"/>
+          </p:cNvSpPr>
+          <p:nvPr>
+            <p:ph type="sldImg"/>
+          </p:nvPr>
+        </p:nvSpPr>
+        <p:spPr/>
+      </p:sp>
+      <p:sp>
+        <p:nvSpPr>
+          <p:cNvPr id="3" name="Notes Placeholder 2"/>
+          <p:cNvSpPr>
+            <a:spLocks noGrp="1"/>
+          </p:cNvSpPr>
+          <p:nvPr>
+            <p:ph type="body" idx="1"/>
+          </p:nvPr>
+        </p:nvSpPr>
+        <p:spPr/>
+        <p:txBody>
+          <a:bodyPr/>
+          <a:lstStyle/>
+          <a:p>
             <a:r>
               <a:rPr lang="en-US" dirty="0" smtClean="0"/>
               <a:t>https://www.amazon.com/Time-Analysis-Forecasting-George-Box/dp/0470272848</a:t>
@@ -916,7 +1084,7 @@
               <a:defRPr/>
             </a:pPr>
             <a:r>
-              <a:rPr lang="en-US" sz="1200" b="1" smtClean="0"/>
+              <a:rPr lang="en-US" sz="1200" b="1" dirty="0" smtClean="0"/>
               <a:t>Time Series Analysis: Forecasting and Control 4th Edition</a:t>
             </a:r>
           </a:p>
@@ -1105,7 +1273,7 @@
                 </a:solidFill>
               </a:rPr>
               <a:pPr/>
-              <a:t>10/9/2025</a:t>
+              <a:t>10/11/2025</a:t>
             </a:fld>
             <a:endParaRPr lang="en-US" dirty="0">
               <a:solidFill>
@@ -1307,7 +1475,7 @@
                 </a:solidFill>
               </a:rPr>
               <a:pPr/>
-              <a:t>10/9/2025</a:t>
+              <a:t>10/11/2025</a:t>
             </a:fld>
             <a:endParaRPr lang="en-US" dirty="0">
               <a:solidFill>
@@ -1519,7 +1687,7 @@
                 </a:solidFill>
               </a:rPr>
               <a:pPr/>
-              <a:t>10/9/2025</a:t>
+              <a:t>10/11/2025</a:t>
             </a:fld>
             <a:endParaRPr lang="en-US" dirty="0">
               <a:solidFill>
@@ -1721,7 +1889,7 @@
                 </a:solidFill>
               </a:rPr>
               <a:pPr/>
-              <a:t>10/9/2025</a:t>
+              <a:t>10/11/2025</a:t>
             </a:fld>
             <a:endParaRPr lang="en-US" dirty="0">
               <a:solidFill>
@@ -1999,7 +2167,7 @@
                 </a:solidFill>
               </a:rPr>
               <a:pPr/>
-              <a:t>10/9/2025</a:t>
+              <a:t>10/11/2025</a:t>
             </a:fld>
             <a:endParaRPr lang="en-US" dirty="0">
               <a:solidFill>
@@ -2263,7 +2431,7 @@
                 </a:solidFill>
               </a:rPr>
               <a:pPr/>
-              <a:t>10/9/2025</a:t>
+              <a:t>10/11/2025</a:t>
             </a:fld>
             <a:endParaRPr lang="en-US" dirty="0">
               <a:solidFill>
@@ -2662,7 +2830,7 @@
                 </a:solidFill>
               </a:rPr>
               <a:pPr/>
-              <a:t>10/9/2025</a:t>
+              <a:t>10/11/2025</a:t>
             </a:fld>
             <a:endParaRPr lang="en-US" dirty="0">
               <a:solidFill>
@@ -2812,7 +2980,7 @@
                 </a:solidFill>
               </a:rPr>
               <a:pPr/>
-              <a:t>10/9/2025</a:t>
+              <a:t>10/11/2025</a:t>
             </a:fld>
             <a:endParaRPr lang="en-US" dirty="0">
               <a:solidFill>
@@ -2939,7 +3107,7 @@
                 </a:solidFill>
               </a:rPr>
               <a:pPr/>
-              <a:t>10/9/2025</a:t>
+              <a:t>10/11/2025</a:t>
             </a:fld>
             <a:endParaRPr lang="en-US" dirty="0">
               <a:solidFill>
@@ -3248,7 +3416,7 @@
                 </a:solidFill>
               </a:rPr>
               <a:pPr/>
-              <a:t>10/9/2025</a:t>
+              <a:t>10/11/2025</a:t>
             </a:fld>
             <a:endParaRPr lang="en-US" dirty="0">
               <a:solidFill>
@@ -3533,7 +3701,7 @@
                 </a:solidFill>
               </a:rPr>
               <a:pPr/>
-              <a:t>10/9/2025</a:t>
+              <a:t>10/11/2025</a:t>
             </a:fld>
             <a:endParaRPr lang="en-US" dirty="0">
               <a:solidFill>
@@ -3771,7 +3939,7 @@
           <a:p>
             <a:fld id="{0A0350BC-ADB8-421A-8AC6-A02A0248976C}" type="datetimeFigureOut">
               <a:rPr lang="en-US" smtClean="0"/>
-              <a:t>10/9/2025</a:t>
+              <a:t>10/11/2025</a:t>
             </a:fld>
             <a:endParaRPr lang="en-US" dirty="0"/>
           </a:p>
@@ -6384,7 +6552,7 @@
           <p:cNvPr id="9" name="object 2">
             <a:extLst>
               <a:ext uri="{FF2B5EF4-FFF2-40B4-BE49-F238E27FC236}">
-                <a16:creationId xmlns:a16="http://schemas.microsoft.com/office/drawing/2014/main" xmlns="" id="{2FDADD92-4E39-7713-520E-D88B1D53A255}"/>
+                <a16:creationId xmlns="" xmlns:a16="http://schemas.microsoft.com/office/drawing/2014/main" id="{2FDADD92-4E39-7713-520E-D88B1D53A255}"/>
               </a:ext>
             </a:extLst>
           </p:cNvPr>
@@ -6460,7 +6628,7 @@
           <p:cNvPr id="3" name="TextBox 2">
             <a:extLst>
               <a:ext uri="{FF2B5EF4-FFF2-40B4-BE49-F238E27FC236}">
-                <a16:creationId xmlns:a16="http://schemas.microsoft.com/office/drawing/2014/main" xmlns="" id="{32F95AAB-C5B6-B581-A19A-2E82775B48CA}"/>
+                <a16:creationId xmlns="" xmlns:a16="http://schemas.microsoft.com/office/drawing/2014/main" id="{32F95AAB-C5B6-B581-A19A-2E82775B48CA}"/>
               </a:ext>
             </a:extLst>
           </p:cNvPr>
@@ -6971,7 +7139,7 @@
           <p:cNvPr id="9" name="object 2">
             <a:extLst>
               <a:ext uri="{FF2B5EF4-FFF2-40B4-BE49-F238E27FC236}">
-                <a16:creationId xmlns:a16="http://schemas.microsoft.com/office/drawing/2014/main" xmlns="" id="{2FDADD92-4E39-7713-520E-D88B1D53A255}"/>
+                <a16:creationId xmlns="" xmlns:a16="http://schemas.microsoft.com/office/drawing/2014/main" id="{2FDADD92-4E39-7713-520E-D88B1D53A255}"/>
               </a:ext>
             </a:extLst>
           </p:cNvPr>
@@ -7047,7 +7215,7 @@
           <p:cNvPr id="3" name="TextBox 2">
             <a:extLst>
               <a:ext uri="{FF2B5EF4-FFF2-40B4-BE49-F238E27FC236}">
-                <a16:creationId xmlns:a16="http://schemas.microsoft.com/office/drawing/2014/main" xmlns="" id="{32F95AAB-C5B6-B581-A19A-2E82775B48CA}"/>
+                <a16:creationId xmlns="" xmlns:a16="http://schemas.microsoft.com/office/drawing/2014/main" id="{32F95AAB-C5B6-B581-A19A-2E82775B48CA}"/>
               </a:ext>
             </a:extLst>
           </p:cNvPr>
@@ -7056,7 +7224,7 @@
         </p:nvSpPr>
         <p:spPr>
           <a:xfrm>
-            <a:off x="488579" y="1261783"/>
+            <a:off x="814670" y="1516307"/>
             <a:ext cx="11377330" cy="4664549"/>
           </a:xfrm>
           <a:prstGeom prst="rect">
@@ -7445,7 +7613,7 @@
           <p:cNvPr id="9" name="object 2">
             <a:extLst>
               <a:ext uri="{FF2B5EF4-FFF2-40B4-BE49-F238E27FC236}">
-                <a16:creationId xmlns:a16="http://schemas.microsoft.com/office/drawing/2014/main" xmlns="" id="{2FDADD92-4E39-7713-520E-D88B1D53A255}"/>
+                <a16:creationId xmlns="" xmlns:a16="http://schemas.microsoft.com/office/drawing/2014/main" id="{2FDADD92-4E39-7713-520E-D88B1D53A255}"/>
               </a:ext>
             </a:extLst>
           </p:cNvPr>
@@ -7521,7 +7689,7 @@
           <p:cNvPr id="4" name="TextBox 3">
             <a:extLst>
               <a:ext uri="{FF2B5EF4-FFF2-40B4-BE49-F238E27FC236}">
-                <a16:creationId xmlns:a16="http://schemas.microsoft.com/office/drawing/2014/main" xmlns="" id="{C9C5E2BE-C2B3-EC7F-6787-5DE873ACFCF7}"/>
+                <a16:creationId xmlns="" xmlns:a16="http://schemas.microsoft.com/office/drawing/2014/main" id="{C9C5E2BE-C2B3-EC7F-6787-5DE873ACFCF7}"/>
               </a:ext>
             </a:extLst>
           </p:cNvPr>
@@ -7569,7 +7737,7 @@
           <p:cNvPr id="5" name="Rectangle: Rounded Corners 4">
             <a:extLst>
               <a:ext uri="{FF2B5EF4-FFF2-40B4-BE49-F238E27FC236}">
-                <a16:creationId xmlns:a16="http://schemas.microsoft.com/office/drawing/2014/main" xmlns="" id="{77F8D955-070E-CA3C-786A-1C78BBBC1CE0}"/>
+                <a16:creationId xmlns="" xmlns:a16="http://schemas.microsoft.com/office/drawing/2014/main" id="{77F8D955-070E-CA3C-786A-1C78BBBC1CE0}"/>
               </a:ext>
             </a:extLst>
           </p:cNvPr>
@@ -7634,7 +7802,7 @@
           <p:cNvPr id="6" name="Rectangle: Rounded Corners 5">
             <a:extLst>
               <a:ext uri="{FF2B5EF4-FFF2-40B4-BE49-F238E27FC236}">
-                <a16:creationId xmlns:a16="http://schemas.microsoft.com/office/drawing/2014/main" xmlns="" id="{D4CF2484-8159-0AA3-2570-A85053777A28}"/>
+                <a16:creationId xmlns="" xmlns:a16="http://schemas.microsoft.com/office/drawing/2014/main" id="{D4CF2484-8159-0AA3-2570-A85053777A28}"/>
               </a:ext>
             </a:extLst>
           </p:cNvPr>
@@ -7694,7 +7862,7 @@
           <p:cNvPr id="7" name="Rectangle: Rounded Corners 6">
             <a:extLst>
               <a:ext uri="{FF2B5EF4-FFF2-40B4-BE49-F238E27FC236}">
-                <a16:creationId xmlns:a16="http://schemas.microsoft.com/office/drawing/2014/main" xmlns="" id="{48851A00-A1C2-C715-FAB5-FC46E4CE7B1A}"/>
+                <a16:creationId xmlns="" xmlns:a16="http://schemas.microsoft.com/office/drawing/2014/main" id="{48851A00-A1C2-C715-FAB5-FC46E4CE7B1A}"/>
               </a:ext>
             </a:extLst>
           </p:cNvPr>
@@ -7757,7 +7925,7 @@
           <p:cNvPr id="10" name="Rectangle: Rounded Corners 9">
             <a:extLst>
               <a:ext uri="{FF2B5EF4-FFF2-40B4-BE49-F238E27FC236}">
-                <a16:creationId xmlns:a16="http://schemas.microsoft.com/office/drawing/2014/main" xmlns="" id="{D44A6FE0-5138-F877-02EA-4A3D83AE4D88}"/>
+                <a16:creationId xmlns="" xmlns:a16="http://schemas.microsoft.com/office/drawing/2014/main" id="{D44A6FE0-5138-F877-02EA-4A3D83AE4D88}"/>
               </a:ext>
             </a:extLst>
           </p:cNvPr>
@@ -7823,7 +7991,7 @@
           <p:cNvPr id="11" name="Rectangle: Rounded Corners 10">
             <a:extLst>
               <a:ext uri="{FF2B5EF4-FFF2-40B4-BE49-F238E27FC236}">
-                <a16:creationId xmlns:a16="http://schemas.microsoft.com/office/drawing/2014/main" xmlns="" id="{74BC09B5-EC78-FDF2-76AC-3145FF761681}"/>
+                <a16:creationId xmlns="" xmlns:a16="http://schemas.microsoft.com/office/drawing/2014/main" id="{74BC09B5-EC78-FDF2-76AC-3145FF761681}"/>
               </a:ext>
             </a:extLst>
           </p:cNvPr>
@@ -7832,7 +8000,7 @@
         </p:nvSpPr>
         <p:spPr>
           <a:xfrm>
-            <a:off x="805543" y="6085114"/>
+            <a:off x="749142" y="6008913"/>
             <a:ext cx="1774372" cy="696686"/>
           </a:xfrm>
           <a:prstGeom prst="roundRect">
@@ -7884,7 +8052,7 @@
           <p:cNvPr id="12" name="Rectangle: Rounded Corners 11">
             <a:extLst>
               <a:ext uri="{FF2B5EF4-FFF2-40B4-BE49-F238E27FC236}">
-                <a16:creationId xmlns:a16="http://schemas.microsoft.com/office/drawing/2014/main" xmlns="" id="{4F09FFBF-73D1-EF10-1AD5-5A0ED1C2C446}"/>
+                <a16:creationId xmlns="" xmlns:a16="http://schemas.microsoft.com/office/drawing/2014/main" id="{4F09FFBF-73D1-EF10-1AD5-5A0ED1C2C446}"/>
               </a:ext>
             </a:extLst>
           </p:cNvPr>
@@ -7948,7 +8116,7 @@
           <p:cNvPr id="14" name="Rectangle: Rounded Corners 13">
             <a:extLst>
               <a:ext uri="{FF2B5EF4-FFF2-40B4-BE49-F238E27FC236}">
-                <a16:creationId xmlns:a16="http://schemas.microsoft.com/office/drawing/2014/main" xmlns="" id="{CADD5F3E-29BA-B5D3-088A-0B4F02529B4C}"/>
+                <a16:creationId xmlns="" xmlns:a16="http://schemas.microsoft.com/office/drawing/2014/main" id="{CADD5F3E-29BA-B5D3-088A-0B4F02529B4C}"/>
               </a:ext>
             </a:extLst>
           </p:cNvPr>
@@ -8003,7 +8171,7 @@
           <p:cNvPr id="15" name="Rectangle: Rounded Corners 14">
             <a:extLst>
               <a:ext uri="{FF2B5EF4-FFF2-40B4-BE49-F238E27FC236}">
-                <a16:creationId xmlns:a16="http://schemas.microsoft.com/office/drawing/2014/main" xmlns="" id="{4CB97974-D5D1-C323-CC24-AB48F80FC753}"/>
+                <a16:creationId xmlns="" xmlns:a16="http://schemas.microsoft.com/office/drawing/2014/main" id="{4CB97974-D5D1-C323-CC24-AB48F80FC753}"/>
               </a:ext>
             </a:extLst>
           </p:cNvPr>
@@ -8063,7 +8231,7 @@
           <p:cNvPr id="16" name="Rectangle: Rounded Corners 15">
             <a:extLst>
               <a:ext uri="{FF2B5EF4-FFF2-40B4-BE49-F238E27FC236}">
-                <a16:creationId xmlns:a16="http://schemas.microsoft.com/office/drawing/2014/main" xmlns="" id="{AA338150-AC44-5534-39D5-9F96133AFBDD}"/>
+                <a16:creationId xmlns="" xmlns:a16="http://schemas.microsoft.com/office/drawing/2014/main" id="{AA338150-AC44-5534-39D5-9F96133AFBDD}"/>
               </a:ext>
             </a:extLst>
           </p:cNvPr>
@@ -8126,7 +8294,7 @@
           <p:cNvPr id="17" name="Rectangle: Rounded Corners 16">
             <a:extLst>
               <a:ext uri="{FF2B5EF4-FFF2-40B4-BE49-F238E27FC236}">
-                <a16:creationId xmlns:a16="http://schemas.microsoft.com/office/drawing/2014/main" xmlns="" id="{7CB2CCED-22BD-6D89-982B-F8CF9DCC8B60}"/>
+                <a16:creationId xmlns="" xmlns:a16="http://schemas.microsoft.com/office/drawing/2014/main" id="{7CB2CCED-22BD-6D89-982B-F8CF9DCC8B60}"/>
               </a:ext>
             </a:extLst>
           </p:cNvPr>
@@ -8189,7 +8357,7 @@
           <p:cNvPr id="19" name="Rectangle: Rounded Corners 18">
             <a:extLst>
               <a:ext uri="{FF2B5EF4-FFF2-40B4-BE49-F238E27FC236}">
-                <a16:creationId xmlns:a16="http://schemas.microsoft.com/office/drawing/2014/main" xmlns="" id="{C2D2D8D1-83EF-CD23-429D-0897E9A87344}"/>
+                <a16:creationId xmlns="" xmlns:a16="http://schemas.microsoft.com/office/drawing/2014/main" id="{C2D2D8D1-83EF-CD23-429D-0897E9A87344}"/>
               </a:ext>
             </a:extLst>
           </p:cNvPr>
@@ -8253,7 +8421,7 @@
           <p:cNvPr id="20" name="Rectangle: Rounded Corners 19">
             <a:extLst>
               <a:ext uri="{FF2B5EF4-FFF2-40B4-BE49-F238E27FC236}">
-                <a16:creationId xmlns:a16="http://schemas.microsoft.com/office/drawing/2014/main" xmlns="" id="{838872E6-0DFF-EDEB-6AD0-C88DABDC707D}"/>
+                <a16:creationId xmlns="" xmlns:a16="http://schemas.microsoft.com/office/drawing/2014/main" id="{838872E6-0DFF-EDEB-6AD0-C88DABDC707D}"/>
               </a:ext>
             </a:extLst>
           </p:cNvPr>
@@ -8323,7 +8491,7 @@
           <p:cNvPr id="21" name="Rectangle: Rounded Corners 20">
             <a:extLst>
               <a:ext uri="{FF2B5EF4-FFF2-40B4-BE49-F238E27FC236}">
-                <a16:creationId xmlns:a16="http://schemas.microsoft.com/office/drawing/2014/main" xmlns="" id="{D974BFAF-FB0C-8C53-24BB-DE892799FF90}"/>
+                <a16:creationId xmlns="" xmlns:a16="http://schemas.microsoft.com/office/drawing/2014/main" id="{D974BFAF-FB0C-8C53-24BB-DE892799FF90}"/>
               </a:ext>
             </a:extLst>
           </p:cNvPr>
@@ -8393,7 +8561,7 @@
           <p:cNvPr id="22" name="Rectangle: Rounded Corners 21">
             <a:extLst>
               <a:ext uri="{FF2B5EF4-FFF2-40B4-BE49-F238E27FC236}">
-                <a16:creationId xmlns:a16="http://schemas.microsoft.com/office/drawing/2014/main" xmlns="" id="{06D2FEDC-E252-6145-230F-07F07A002B04}"/>
+                <a16:creationId xmlns="" xmlns:a16="http://schemas.microsoft.com/office/drawing/2014/main" id="{06D2FEDC-E252-6145-230F-07F07A002B04}"/>
               </a:ext>
             </a:extLst>
           </p:cNvPr>
@@ -8463,7 +8631,7 @@
           <p:cNvPr id="23" name="Rectangle: Rounded Corners 22">
             <a:extLst>
               <a:ext uri="{FF2B5EF4-FFF2-40B4-BE49-F238E27FC236}">
-                <a16:creationId xmlns:a16="http://schemas.microsoft.com/office/drawing/2014/main" xmlns="" id="{34083836-FDF9-41E5-76EE-1D32A490EF47}"/>
+                <a16:creationId xmlns="" xmlns:a16="http://schemas.microsoft.com/office/drawing/2014/main" id="{34083836-FDF9-41E5-76EE-1D32A490EF47}"/>
               </a:ext>
             </a:extLst>
           </p:cNvPr>
@@ -8523,7 +8691,7 @@
           <p:cNvPr id="25" name="Straight Arrow Connector 24">
             <a:extLst>
               <a:ext uri="{FF2B5EF4-FFF2-40B4-BE49-F238E27FC236}">
-                <a16:creationId xmlns:a16="http://schemas.microsoft.com/office/drawing/2014/main" xmlns="" id="{F634947C-9C56-9009-B328-C39A90C3B7E3}"/>
+                <a16:creationId xmlns="" xmlns:a16="http://schemas.microsoft.com/office/drawing/2014/main" id="{F634947C-9C56-9009-B328-C39A90C3B7E3}"/>
               </a:ext>
             </a:extLst>
           </p:cNvPr>
@@ -8560,7 +8728,7 @@
           <p:cNvPr id="26" name="Straight Arrow Connector 25">
             <a:extLst>
               <a:ext uri="{FF2B5EF4-FFF2-40B4-BE49-F238E27FC236}">
-                <a16:creationId xmlns:a16="http://schemas.microsoft.com/office/drawing/2014/main" xmlns="" id="{869856F7-CE28-3231-E15E-8FB5B477404C}"/>
+                <a16:creationId xmlns="" xmlns:a16="http://schemas.microsoft.com/office/drawing/2014/main" id="{869856F7-CE28-3231-E15E-8FB5B477404C}"/>
               </a:ext>
             </a:extLst>
           </p:cNvPr>
@@ -8599,7 +8767,7 @@
           <p:cNvPr id="27" name="Straight Arrow Connector 26">
             <a:extLst>
               <a:ext uri="{FF2B5EF4-FFF2-40B4-BE49-F238E27FC236}">
-                <a16:creationId xmlns:a16="http://schemas.microsoft.com/office/drawing/2014/main" xmlns="" id="{0DF2BED7-27F9-E54A-BA1B-E63753DB8AB8}"/>
+                <a16:creationId xmlns="" xmlns:a16="http://schemas.microsoft.com/office/drawing/2014/main" id="{0DF2BED7-27F9-E54A-BA1B-E63753DB8AB8}"/>
               </a:ext>
             </a:extLst>
           </p:cNvPr>
@@ -8640,7 +8808,7 @@
           <p:cNvPr id="28" name="Straight Arrow Connector 27">
             <a:extLst>
               <a:ext uri="{FF2B5EF4-FFF2-40B4-BE49-F238E27FC236}">
-                <a16:creationId xmlns:a16="http://schemas.microsoft.com/office/drawing/2014/main" xmlns="" id="{BB0FFC6E-95BE-ABAC-BCE9-DB5BA925ACDB}"/>
+                <a16:creationId xmlns="" xmlns:a16="http://schemas.microsoft.com/office/drawing/2014/main" id="{BB0FFC6E-95BE-ABAC-BCE9-DB5BA925ACDB}"/>
               </a:ext>
             </a:extLst>
           </p:cNvPr>
@@ -8681,7 +8849,7 @@
           <p:cNvPr id="29" name="Straight Arrow Connector 28">
             <a:extLst>
               <a:ext uri="{FF2B5EF4-FFF2-40B4-BE49-F238E27FC236}">
-                <a16:creationId xmlns:a16="http://schemas.microsoft.com/office/drawing/2014/main" xmlns="" id="{D77BF6B6-0573-8972-DF60-804B93BD1258}"/>
+                <a16:creationId xmlns="" xmlns:a16="http://schemas.microsoft.com/office/drawing/2014/main" id="{D77BF6B6-0573-8972-DF60-804B93BD1258}"/>
               </a:ext>
             </a:extLst>
           </p:cNvPr>
@@ -8722,7 +8890,7 @@
           <p:cNvPr id="30" name="Straight Arrow Connector 29">
             <a:extLst>
               <a:ext uri="{FF2B5EF4-FFF2-40B4-BE49-F238E27FC236}">
-                <a16:creationId xmlns:a16="http://schemas.microsoft.com/office/drawing/2014/main" xmlns="" id="{7FB4716B-00F2-0500-1F24-B0650AD1D519}"/>
+                <a16:creationId xmlns="" xmlns:a16="http://schemas.microsoft.com/office/drawing/2014/main" id="{7FB4716B-00F2-0500-1F24-B0650AD1D519}"/>
               </a:ext>
             </a:extLst>
           </p:cNvPr>
@@ -8763,7 +8931,7 @@
           <p:cNvPr id="31" name="Straight Arrow Connector 30">
             <a:extLst>
               <a:ext uri="{FF2B5EF4-FFF2-40B4-BE49-F238E27FC236}">
-                <a16:creationId xmlns:a16="http://schemas.microsoft.com/office/drawing/2014/main" xmlns="" id="{24D441D1-2F7E-E41B-1D67-F50104A1019E}"/>
+                <a16:creationId xmlns="" xmlns:a16="http://schemas.microsoft.com/office/drawing/2014/main" id="{24D441D1-2F7E-E41B-1D67-F50104A1019E}"/>
               </a:ext>
             </a:extLst>
           </p:cNvPr>
@@ -8802,7 +8970,7 @@
           <p:cNvPr id="35" name="Straight Arrow Connector 34">
             <a:extLst>
               <a:ext uri="{FF2B5EF4-FFF2-40B4-BE49-F238E27FC236}">
-                <a16:creationId xmlns:a16="http://schemas.microsoft.com/office/drawing/2014/main" xmlns="" id="{78F4C5EA-F78E-B880-5439-8E9E78307982}"/>
+                <a16:creationId xmlns="" xmlns:a16="http://schemas.microsoft.com/office/drawing/2014/main" id="{78F4C5EA-F78E-B880-5439-8E9E78307982}"/>
               </a:ext>
             </a:extLst>
           </p:cNvPr>
@@ -8841,7 +9009,7 @@
           <p:cNvPr id="36" name="Straight Arrow Connector 35">
             <a:extLst>
               <a:ext uri="{FF2B5EF4-FFF2-40B4-BE49-F238E27FC236}">
-                <a16:creationId xmlns:a16="http://schemas.microsoft.com/office/drawing/2014/main" xmlns="" id="{826AF0A7-D611-96B7-887F-9AEF5045E535}"/>
+                <a16:creationId xmlns="" xmlns:a16="http://schemas.microsoft.com/office/drawing/2014/main" id="{826AF0A7-D611-96B7-887F-9AEF5045E535}"/>
               </a:ext>
             </a:extLst>
           </p:cNvPr>
@@ -8882,7 +9050,7 @@
           <p:cNvPr id="37" name="Straight Arrow Connector 36">
             <a:extLst>
               <a:ext uri="{FF2B5EF4-FFF2-40B4-BE49-F238E27FC236}">
-                <a16:creationId xmlns:a16="http://schemas.microsoft.com/office/drawing/2014/main" xmlns="" id="{361177D9-27E2-7E6B-A4D4-D7FC32DED35A}"/>
+                <a16:creationId xmlns="" xmlns:a16="http://schemas.microsoft.com/office/drawing/2014/main" id="{361177D9-27E2-7E6B-A4D4-D7FC32DED35A}"/>
               </a:ext>
             </a:extLst>
           </p:cNvPr>
@@ -8923,7 +9091,7 @@
           <p:cNvPr id="38" name="Straight Arrow Connector 37">
             <a:extLst>
               <a:ext uri="{FF2B5EF4-FFF2-40B4-BE49-F238E27FC236}">
-                <a16:creationId xmlns:a16="http://schemas.microsoft.com/office/drawing/2014/main" xmlns="" id="{4F1E5B39-66CC-B4B9-FBBB-844D955099B1}"/>
+                <a16:creationId xmlns="" xmlns:a16="http://schemas.microsoft.com/office/drawing/2014/main" id="{4F1E5B39-66CC-B4B9-FBBB-844D955099B1}"/>
               </a:ext>
             </a:extLst>
           </p:cNvPr>
@@ -8964,7 +9132,7 @@
           <p:cNvPr id="39" name="Straight Arrow Connector 38">
             <a:extLst>
               <a:ext uri="{FF2B5EF4-FFF2-40B4-BE49-F238E27FC236}">
-                <a16:creationId xmlns:a16="http://schemas.microsoft.com/office/drawing/2014/main" xmlns="" id="{364D7D6E-E22B-57A7-975B-AD8CEAC00312}"/>
+                <a16:creationId xmlns="" xmlns:a16="http://schemas.microsoft.com/office/drawing/2014/main" id="{364D7D6E-E22B-57A7-975B-AD8CEAC00312}"/>
               </a:ext>
             </a:extLst>
           </p:cNvPr>
@@ -9005,7 +9173,7 @@
           <p:cNvPr id="40" name="Rectangle: Rounded Corners 39">
             <a:extLst>
               <a:ext uri="{FF2B5EF4-FFF2-40B4-BE49-F238E27FC236}">
-                <a16:creationId xmlns:a16="http://schemas.microsoft.com/office/drawing/2014/main" xmlns="" id="{011476DB-8151-F24F-AD12-60B36C053DE9}"/>
+                <a16:creationId xmlns="" xmlns:a16="http://schemas.microsoft.com/office/drawing/2014/main" id="{011476DB-8151-F24F-AD12-60B36C053DE9}"/>
               </a:ext>
             </a:extLst>
           </p:cNvPr>
@@ -9060,7 +9228,7 @@
           <p:cNvPr id="41" name="Rectangle: Rounded Corners 40">
             <a:extLst>
               <a:ext uri="{FF2B5EF4-FFF2-40B4-BE49-F238E27FC236}">
-                <a16:creationId xmlns:a16="http://schemas.microsoft.com/office/drawing/2014/main" xmlns="" id="{23B1FE31-9E31-FB0F-22D6-B8A9A43917D2}"/>
+                <a16:creationId xmlns="" xmlns:a16="http://schemas.microsoft.com/office/drawing/2014/main" id="{23B1FE31-9E31-FB0F-22D6-B8A9A43917D2}"/>
               </a:ext>
             </a:extLst>
           </p:cNvPr>
@@ -9115,7 +9283,7 @@
           <p:cNvPr id="42" name="Rectangle: Rounded Corners 41">
             <a:extLst>
               <a:ext uri="{FF2B5EF4-FFF2-40B4-BE49-F238E27FC236}">
-                <a16:creationId xmlns:a16="http://schemas.microsoft.com/office/drawing/2014/main" xmlns="" id="{CD34A185-5C90-9993-5E8A-5567D4706C25}"/>
+                <a16:creationId xmlns="" xmlns:a16="http://schemas.microsoft.com/office/drawing/2014/main" id="{CD34A185-5C90-9993-5E8A-5567D4706C25}"/>
               </a:ext>
             </a:extLst>
           </p:cNvPr>
@@ -9170,7 +9338,7 @@
           <p:cNvPr id="44" name="Straight Arrow Connector 43">
             <a:extLst>
               <a:ext uri="{FF2B5EF4-FFF2-40B4-BE49-F238E27FC236}">
-                <a16:creationId xmlns:a16="http://schemas.microsoft.com/office/drawing/2014/main" xmlns="" id="{A7F1F811-8FA3-7C98-4E45-8D344B717E37}"/>
+                <a16:creationId xmlns="" xmlns:a16="http://schemas.microsoft.com/office/drawing/2014/main" id="{A7F1F811-8FA3-7C98-4E45-8D344B717E37}"/>
               </a:ext>
             </a:extLst>
           </p:cNvPr>
@@ -9209,7 +9377,7 @@
           <p:cNvPr id="45" name="Straight Arrow Connector 44">
             <a:extLst>
               <a:ext uri="{FF2B5EF4-FFF2-40B4-BE49-F238E27FC236}">
-                <a16:creationId xmlns:a16="http://schemas.microsoft.com/office/drawing/2014/main" xmlns="" id="{46B24766-9BB9-4325-980C-C814E3F5576B}"/>
+                <a16:creationId xmlns="" xmlns:a16="http://schemas.microsoft.com/office/drawing/2014/main" id="{46B24766-9BB9-4325-980C-C814E3F5576B}"/>
               </a:ext>
             </a:extLst>
           </p:cNvPr>
@@ -9250,7 +9418,7 @@
           <p:cNvPr id="46" name="Straight Arrow Connector 45">
             <a:extLst>
               <a:ext uri="{FF2B5EF4-FFF2-40B4-BE49-F238E27FC236}">
-                <a16:creationId xmlns:a16="http://schemas.microsoft.com/office/drawing/2014/main" xmlns="" id="{BB2A5682-DA7C-3A7D-F51D-1E363F0F7DBA}"/>
+                <a16:creationId xmlns="" xmlns:a16="http://schemas.microsoft.com/office/drawing/2014/main" id="{BB2A5682-DA7C-3A7D-F51D-1E363F0F7DBA}"/>
               </a:ext>
             </a:extLst>
           </p:cNvPr>
@@ -9291,7 +9459,7 @@
           <p:cNvPr id="47" name="Straight Arrow Connector 46">
             <a:extLst>
               <a:ext uri="{FF2B5EF4-FFF2-40B4-BE49-F238E27FC236}">
-                <a16:creationId xmlns:a16="http://schemas.microsoft.com/office/drawing/2014/main" xmlns="" id="{BDBC0385-295B-D878-C6B7-FB8F5E333606}"/>
+                <a16:creationId xmlns="" xmlns:a16="http://schemas.microsoft.com/office/drawing/2014/main" id="{BDBC0385-295B-D878-C6B7-FB8F5E333606}"/>
               </a:ext>
             </a:extLst>
           </p:cNvPr>
@@ -9332,7 +9500,7 @@
           <p:cNvPr id="48" name="Rectangle: Rounded Corners 47">
             <a:extLst>
               <a:ext uri="{FF2B5EF4-FFF2-40B4-BE49-F238E27FC236}">
-                <a16:creationId xmlns:a16="http://schemas.microsoft.com/office/drawing/2014/main" xmlns="" id="{57BCC33A-56E8-0297-EB32-3C31AEB3E944}"/>
+                <a16:creationId xmlns="" xmlns:a16="http://schemas.microsoft.com/office/drawing/2014/main" id="{57BCC33A-56E8-0297-EB32-3C31AEB3E944}"/>
               </a:ext>
             </a:extLst>
           </p:cNvPr>
@@ -9387,7 +9555,7 @@
           <p:cNvPr id="50" name="Rectangle: Rounded Corners 49">
             <a:extLst>
               <a:ext uri="{FF2B5EF4-FFF2-40B4-BE49-F238E27FC236}">
-                <a16:creationId xmlns:a16="http://schemas.microsoft.com/office/drawing/2014/main" xmlns="" id="{283ADF73-8FED-C070-3B50-34A3F8EDE2AF}"/>
+                <a16:creationId xmlns="" xmlns:a16="http://schemas.microsoft.com/office/drawing/2014/main" id="{283ADF73-8FED-C070-3B50-34A3F8EDE2AF}"/>
               </a:ext>
             </a:extLst>
           </p:cNvPr>
@@ -9442,7 +9610,7 @@
           <p:cNvPr id="52" name="Straight Arrow Connector 51">
             <a:extLst>
               <a:ext uri="{FF2B5EF4-FFF2-40B4-BE49-F238E27FC236}">
-                <a16:creationId xmlns:a16="http://schemas.microsoft.com/office/drawing/2014/main" xmlns="" id="{4934DE13-6FE6-66B3-CE78-63C710703E15}"/>
+                <a16:creationId xmlns="" xmlns:a16="http://schemas.microsoft.com/office/drawing/2014/main" id="{4934DE13-6FE6-66B3-CE78-63C710703E15}"/>
               </a:ext>
             </a:extLst>
           </p:cNvPr>
@@ -9483,7 +9651,7 @@
           <p:cNvPr id="53" name="Straight Arrow Connector 52">
             <a:extLst>
               <a:ext uri="{FF2B5EF4-FFF2-40B4-BE49-F238E27FC236}">
-                <a16:creationId xmlns:a16="http://schemas.microsoft.com/office/drawing/2014/main" xmlns="" id="{F2A810A1-0FC8-456B-4F05-03349A47D731}"/>
+                <a16:creationId xmlns="" xmlns:a16="http://schemas.microsoft.com/office/drawing/2014/main" id="{F2A810A1-0FC8-456B-4F05-03349A47D731}"/>
               </a:ext>
             </a:extLst>
           </p:cNvPr>
@@ -9524,7 +9692,7 @@
           <p:cNvPr id="54" name="Rectangle: Rounded Corners 53">
             <a:extLst>
               <a:ext uri="{FF2B5EF4-FFF2-40B4-BE49-F238E27FC236}">
-                <a16:creationId xmlns:a16="http://schemas.microsoft.com/office/drawing/2014/main" xmlns="" id="{A2193182-40A7-6EC6-ACFB-1195D14AF310}"/>
+                <a16:creationId xmlns="" xmlns:a16="http://schemas.microsoft.com/office/drawing/2014/main" id="{A2193182-40A7-6EC6-ACFB-1195D14AF310}"/>
               </a:ext>
             </a:extLst>
           </p:cNvPr>
@@ -9579,7 +9747,7 @@
           <p:cNvPr id="55" name="Straight Arrow Connector 54">
             <a:extLst>
               <a:ext uri="{FF2B5EF4-FFF2-40B4-BE49-F238E27FC236}">
-                <a16:creationId xmlns:a16="http://schemas.microsoft.com/office/drawing/2014/main" xmlns="" id="{2828E4D8-AD3F-7612-80A2-4076E7C328CE}"/>
+                <a16:creationId xmlns="" xmlns:a16="http://schemas.microsoft.com/office/drawing/2014/main" id="{2828E4D8-AD3F-7612-80A2-4076E7C328CE}"/>
               </a:ext>
             </a:extLst>
           </p:cNvPr>
@@ -9620,7 +9788,7 @@
           <p:cNvPr id="57" name="Straight Arrow Connector 56">
             <a:extLst>
               <a:ext uri="{FF2B5EF4-FFF2-40B4-BE49-F238E27FC236}">
-                <a16:creationId xmlns:a16="http://schemas.microsoft.com/office/drawing/2014/main" xmlns="" id="{A067F872-D865-3B3C-1742-F96CF178938D}"/>
+                <a16:creationId xmlns="" xmlns:a16="http://schemas.microsoft.com/office/drawing/2014/main" id="{A067F872-D865-3B3C-1742-F96CF178938D}"/>
               </a:ext>
             </a:extLst>
           </p:cNvPr>
@@ -9661,7 +9829,7 @@
           <p:cNvPr id="58" name="Straight Arrow Connector 57">
             <a:extLst>
               <a:ext uri="{FF2B5EF4-FFF2-40B4-BE49-F238E27FC236}">
-                <a16:creationId xmlns:a16="http://schemas.microsoft.com/office/drawing/2014/main" xmlns="" id="{52FD9D50-45F4-FA8D-EFD9-4493396541D3}"/>
+                <a16:creationId xmlns="" xmlns:a16="http://schemas.microsoft.com/office/drawing/2014/main" id="{52FD9D50-45F4-FA8D-EFD9-4493396541D3}"/>
               </a:ext>
             </a:extLst>
           </p:cNvPr>
@@ -9702,7 +9870,7 @@
           <p:cNvPr id="59" name="Straight Arrow Connector 58">
             <a:extLst>
               <a:ext uri="{FF2B5EF4-FFF2-40B4-BE49-F238E27FC236}">
-                <a16:creationId xmlns:a16="http://schemas.microsoft.com/office/drawing/2014/main" xmlns="" id="{968498C6-CDCD-C4FC-DEAD-AEEEAE9D494D}"/>
+                <a16:creationId xmlns="" xmlns:a16="http://schemas.microsoft.com/office/drawing/2014/main" id="{968498C6-CDCD-C4FC-DEAD-AEEEAE9D494D}"/>
               </a:ext>
             </a:extLst>
           </p:cNvPr>
@@ -9743,7 +9911,7 @@
           <p:cNvPr id="60" name="Straight Arrow Connector 59">
             <a:extLst>
               <a:ext uri="{FF2B5EF4-FFF2-40B4-BE49-F238E27FC236}">
-                <a16:creationId xmlns:a16="http://schemas.microsoft.com/office/drawing/2014/main" xmlns="" id="{5BA600CB-8983-6642-B34B-4042D7F55FEC}"/>
+                <a16:creationId xmlns="" xmlns:a16="http://schemas.microsoft.com/office/drawing/2014/main" id="{5BA600CB-8983-6642-B34B-4042D7F55FEC}"/>
               </a:ext>
             </a:extLst>
           </p:cNvPr>
@@ -9784,7 +9952,7 @@
           <p:cNvPr id="61" name="Straight Arrow Connector 60">
             <a:extLst>
               <a:ext uri="{FF2B5EF4-FFF2-40B4-BE49-F238E27FC236}">
-                <a16:creationId xmlns:a16="http://schemas.microsoft.com/office/drawing/2014/main" xmlns="" id="{5B75E939-8D02-8249-881F-F335E63D1BE0}"/>
+                <a16:creationId xmlns="" xmlns:a16="http://schemas.microsoft.com/office/drawing/2014/main" id="{5B75E939-8D02-8249-881F-F335E63D1BE0}"/>
               </a:ext>
             </a:extLst>
           </p:cNvPr>
@@ -9825,7 +9993,7 @@
           <p:cNvPr id="62" name="Straight Arrow Connector 61">
             <a:extLst>
               <a:ext uri="{FF2B5EF4-FFF2-40B4-BE49-F238E27FC236}">
-                <a16:creationId xmlns:a16="http://schemas.microsoft.com/office/drawing/2014/main" xmlns="" id="{DA4891DB-30DF-A617-C12F-2F30D7AFA58A}"/>
+                <a16:creationId xmlns="" xmlns:a16="http://schemas.microsoft.com/office/drawing/2014/main" id="{DA4891DB-30DF-A617-C12F-2F30D7AFA58A}"/>
               </a:ext>
             </a:extLst>
           </p:cNvPr>
@@ -9896,7 +10064,7 @@
           <p:cNvPr id="9" name="object 2">
             <a:extLst>
               <a:ext uri="{FF2B5EF4-FFF2-40B4-BE49-F238E27FC236}">
-                <a16:creationId xmlns:a16="http://schemas.microsoft.com/office/drawing/2014/main" xmlns="" id="{2FDADD92-4E39-7713-520E-D88B1D53A255}"/>
+                <a16:creationId xmlns="" xmlns:a16="http://schemas.microsoft.com/office/drawing/2014/main" id="{2FDADD92-4E39-7713-520E-D88B1D53A255}"/>
               </a:ext>
             </a:extLst>
           </p:cNvPr>
@@ -9972,7 +10140,7 @@
           <p:cNvPr id="3" name="TextBox 2">
             <a:extLst>
               <a:ext uri="{FF2B5EF4-FFF2-40B4-BE49-F238E27FC236}">
-                <a16:creationId xmlns:a16="http://schemas.microsoft.com/office/drawing/2014/main" xmlns="" id="{32F95AAB-C5B6-B581-A19A-2E82775B48CA}"/>
+                <a16:creationId xmlns="" xmlns:a16="http://schemas.microsoft.com/office/drawing/2014/main" id="{32F95AAB-C5B6-B581-A19A-2E82775B48CA}"/>
               </a:ext>
             </a:extLst>
           </p:cNvPr>
@@ -10227,7 +10395,7 @@
           <p:cNvPr id="9" name="object 2">
             <a:extLst>
               <a:ext uri="{FF2B5EF4-FFF2-40B4-BE49-F238E27FC236}">
-                <a16:creationId xmlns:a16="http://schemas.microsoft.com/office/drawing/2014/main" xmlns="" id="{2FDADD92-4E39-7713-520E-D88B1D53A255}"/>
+                <a16:creationId xmlns="" xmlns:a16="http://schemas.microsoft.com/office/drawing/2014/main" id="{2FDADD92-4E39-7713-520E-D88B1D53A255}"/>
               </a:ext>
             </a:extLst>
           </p:cNvPr>
@@ -10294,7 +10462,7 @@
           <p:cNvPr id="3" name="TextBox 2">
             <a:extLst>
               <a:ext uri="{FF2B5EF4-FFF2-40B4-BE49-F238E27FC236}">
-                <a16:creationId xmlns:a16="http://schemas.microsoft.com/office/drawing/2014/main" xmlns="" id="{32F95AAB-C5B6-B581-A19A-2E82775B48CA}"/>
+                <a16:creationId xmlns="" xmlns:a16="http://schemas.microsoft.com/office/drawing/2014/main" id="{32F95AAB-C5B6-B581-A19A-2E82775B48CA}"/>
               </a:ext>
             </a:extLst>
           </p:cNvPr>
@@ -10480,7 +10648,7 @@
           <p:cNvPr id="9" name="object 2">
             <a:extLst>
               <a:ext uri="{FF2B5EF4-FFF2-40B4-BE49-F238E27FC236}">
-                <a16:creationId xmlns:a16="http://schemas.microsoft.com/office/drawing/2014/main" xmlns="" id="{2FDADD92-4E39-7713-520E-D88B1D53A255}"/>
+                <a16:creationId xmlns="" xmlns:a16="http://schemas.microsoft.com/office/drawing/2014/main" id="{2FDADD92-4E39-7713-520E-D88B1D53A255}"/>
               </a:ext>
             </a:extLst>
           </p:cNvPr>
@@ -10547,7 +10715,7 @@
           <p:cNvPr id="3" name="TextBox 2">
             <a:extLst>
               <a:ext uri="{FF2B5EF4-FFF2-40B4-BE49-F238E27FC236}">
-                <a16:creationId xmlns:a16="http://schemas.microsoft.com/office/drawing/2014/main" xmlns="" id="{32F95AAB-C5B6-B581-A19A-2E82775B48CA}"/>
+                <a16:creationId xmlns="" xmlns:a16="http://schemas.microsoft.com/office/drawing/2014/main" id="{32F95AAB-C5B6-B581-A19A-2E82775B48CA}"/>
               </a:ext>
             </a:extLst>
           </p:cNvPr>
@@ -10793,7 +10961,7 @@
           <p:cNvPr id="9" name="object 2">
             <a:extLst>
               <a:ext uri="{FF2B5EF4-FFF2-40B4-BE49-F238E27FC236}">
-                <a16:creationId xmlns:a16="http://schemas.microsoft.com/office/drawing/2014/main" xmlns="" id="{2FDADD92-4E39-7713-520E-D88B1D53A255}"/>
+                <a16:creationId xmlns="" xmlns:a16="http://schemas.microsoft.com/office/drawing/2014/main" id="{2FDADD92-4E39-7713-520E-D88B1D53A255}"/>
               </a:ext>
             </a:extLst>
           </p:cNvPr>
@@ -10860,7 +11028,7 @@
           <p:cNvPr id="3" name="TextBox 2">
             <a:extLst>
               <a:ext uri="{FF2B5EF4-FFF2-40B4-BE49-F238E27FC236}">
-                <a16:creationId xmlns:a16="http://schemas.microsoft.com/office/drawing/2014/main" xmlns="" id="{32F95AAB-C5B6-B581-A19A-2E82775B48CA}"/>
+                <a16:creationId xmlns="" xmlns:a16="http://schemas.microsoft.com/office/drawing/2014/main" id="{32F95AAB-C5B6-B581-A19A-2E82775B48CA}"/>
               </a:ext>
             </a:extLst>
           </p:cNvPr>
@@ -11107,7 +11275,7 @@
           <p:cNvPr id="9" name="object 2">
             <a:extLst>
               <a:ext uri="{FF2B5EF4-FFF2-40B4-BE49-F238E27FC236}">
-                <a16:creationId xmlns:a16="http://schemas.microsoft.com/office/drawing/2014/main" xmlns="" id="{2FDADD92-4E39-7713-520E-D88B1D53A255}"/>
+                <a16:creationId xmlns="" xmlns:a16="http://schemas.microsoft.com/office/drawing/2014/main" id="{2FDADD92-4E39-7713-520E-D88B1D53A255}"/>
               </a:ext>
             </a:extLst>
           </p:cNvPr>
@@ -11183,7 +11351,7 @@
           <p:cNvPr id="3" name="TextBox 2">
             <a:extLst>
               <a:ext uri="{FF2B5EF4-FFF2-40B4-BE49-F238E27FC236}">
-                <a16:creationId xmlns:a16="http://schemas.microsoft.com/office/drawing/2014/main" xmlns="" id="{32F95AAB-C5B6-B581-A19A-2E82775B48CA}"/>
+                <a16:creationId xmlns="" xmlns:a16="http://schemas.microsoft.com/office/drawing/2014/main" id="{32F95AAB-C5B6-B581-A19A-2E82775B48CA}"/>
               </a:ext>
             </a:extLst>
           </p:cNvPr>
@@ -11494,7 +11662,7 @@
           <p:cNvPr id="9" name="object 2">
             <a:extLst>
               <a:ext uri="{FF2B5EF4-FFF2-40B4-BE49-F238E27FC236}">
-                <a16:creationId xmlns:a16="http://schemas.microsoft.com/office/drawing/2014/main" xmlns="" id="{2FDADD92-4E39-7713-520E-D88B1D53A255}"/>
+                <a16:creationId xmlns="" xmlns:a16="http://schemas.microsoft.com/office/drawing/2014/main" id="{2FDADD92-4E39-7713-520E-D88B1D53A255}"/>
               </a:ext>
             </a:extLst>
           </p:cNvPr>
@@ -11570,7 +11738,7 @@
           <p:cNvPr id="3" name="TextBox 2">
             <a:extLst>
               <a:ext uri="{FF2B5EF4-FFF2-40B4-BE49-F238E27FC236}">
-                <a16:creationId xmlns:a16="http://schemas.microsoft.com/office/drawing/2014/main" xmlns="" id="{32F95AAB-C5B6-B581-A19A-2E82775B48CA}"/>
+                <a16:creationId xmlns="" xmlns:a16="http://schemas.microsoft.com/office/drawing/2014/main" id="{32F95AAB-C5B6-B581-A19A-2E82775B48CA}"/>
               </a:ext>
             </a:extLst>
           </p:cNvPr>
@@ -11761,7 +11929,7 @@
           <p:cNvPr id="9" name="object 2">
             <a:extLst>
               <a:ext uri="{FF2B5EF4-FFF2-40B4-BE49-F238E27FC236}">
-                <a16:creationId xmlns:a16="http://schemas.microsoft.com/office/drawing/2014/main" xmlns="" id="{2FDADD92-4E39-7713-520E-D88B1D53A255}"/>
+                <a16:creationId xmlns="" xmlns:a16="http://schemas.microsoft.com/office/drawing/2014/main" id="{2FDADD92-4E39-7713-520E-D88B1D53A255}"/>
               </a:ext>
             </a:extLst>
           </p:cNvPr>
@@ -11828,7 +11996,7 @@
           <p:cNvPr id="3" name="TextBox 2">
             <a:extLst>
               <a:ext uri="{FF2B5EF4-FFF2-40B4-BE49-F238E27FC236}">
-                <a16:creationId xmlns:a16="http://schemas.microsoft.com/office/drawing/2014/main" xmlns="" id="{32F95AAB-C5B6-B581-A19A-2E82775B48CA}"/>
+                <a16:creationId xmlns="" xmlns:a16="http://schemas.microsoft.com/office/drawing/2014/main" id="{32F95AAB-C5B6-B581-A19A-2E82775B48CA}"/>
               </a:ext>
             </a:extLst>
           </p:cNvPr>
@@ -12242,7 +12410,7 @@
           <p:cNvPr id="9" name="object 2">
             <a:extLst>
               <a:ext uri="{FF2B5EF4-FFF2-40B4-BE49-F238E27FC236}">
-                <a16:creationId xmlns:a16="http://schemas.microsoft.com/office/drawing/2014/main" xmlns="" id="{2FDADD92-4E39-7713-520E-D88B1D53A255}"/>
+                <a16:creationId xmlns="" xmlns:a16="http://schemas.microsoft.com/office/drawing/2014/main" id="{2FDADD92-4E39-7713-520E-D88B1D53A255}"/>
               </a:ext>
             </a:extLst>
           </p:cNvPr>
@@ -12309,7 +12477,7 @@
           <p:cNvPr id="3" name="TextBox 2">
             <a:extLst>
               <a:ext uri="{FF2B5EF4-FFF2-40B4-BE49-F238E27FC236}">
-                <a16:creationId xmlns:a16="http://schemas.microsoft.com/office/drawing/2014/main" xmlns="" id="{32F95AAB-C5B6-B581-A19A-2E82775B48CA}"/>
+                <a16:creationId xmlns="" xmlns:a16="http://schemas.microsoft.com/office/drawing/2014/main" id="{32F95AAB-C5B6-B581-A19A-2E82775B48CA}"/>
               </a:ext>
             </a:extLst>
           </p:cNvPr>
@@ -12540,7 +12708,7 @@
           <p:cNvPr id="9" name="object 2">
             <a:extLst>
               <a:ext uri="{FF2B5EF4-FFF2-40B4-BE49-F238E27FC236}">
-                <a16:creationId xmlns:a16="http://schemas.microsoft.com/office/drawing/2014/main" xmlns="" id="{2FDADD92-4E39-7713-520E-D88B1D53A255}"/>
+                <a16:creationId xmlns="" xmlns:a16="http://schemas.microsoft.com/office/drawing/2014/main" id="{2FDADD92-4E39-7713-520E-D88B1D53A255}"/>
               </a:ext>
             </a:extLst>
           </p:cNvPr>
@@ -12607,7 +12775,7 @@
           <p:cNvPr id="3" name="TextBox 2">
             <a:extLst>
               <a:ext uri="{FF2B5EF4-FFF2-40B4-BE49-F238E27FC236}">
-                <a16:creationId xmlns:a16="http://schemas.microsoft.com/office/drawing/2014/main" xmlns="" id="{32F95AAB-C5B6-B581-A19A-2E82775B48CA}"/>
+                <a16:creationId xmlns="" xmlns:a16="http://schemas.microsoft.com/office/drawing/2014/main" id="{32F95AAB-C5B6-B581-A19A-2E82775B48CA}"/>
               </a:ext>
             </a:extLst>
           </p:cNvPr>
@@ -12891,22 +13059,26 @@
             </a:r>
             <a:r>
               <a:rPr lang="en-US" dirty="0"/>
-              <a:t>: The average value of the white noise series should be zero.</a:t>
-            </a:r>
-          </a:p>
-          <a:p>
-            <a:r>
-              <a:rPr lang="en-US" b="1" dirty="0"/>
+              <a:t>: </a:t>
+            </a:r>
+            <a:r>
+              <a:rPr lang="en-US" dirty="0" smtClean="0"/>
+              <a:t>The average value of the white noise series should be zero.</a:t>
+            </a:r>
+          </a:p>
+          <a:p>
+            <a:r>
+              <a:rPr lang="en-US" b="1" dirty="0" smtClean="0"/>
               <a:t>Constant Variance</a:t>
             </a:r>
             <a:r>
-              <a:rPr lang="en-US" dirty="0"/>
+              <a:rPr lang="en-US" dirty="0" smtClean="0"/>
               <a:t>: The variance of the white noise series should be constant over time.</a:t>
             </a:r>
           </a:p>
           <a:p>
             <a:r>
-              <a:rPr lang="en-US" b="1" dirty="0"/>
+              <a:rPr lang="en-US" b="1" dirty="0" smtClean="0"/>
               <a:t>Independence</a:t>
             </a:r>
             <a:r>
@@ -13146,7 +13318,7 @@
         </p:nvSpPr>
         <p:spPr>
           <a:xfrm>
-            <a:off x="838202" y="1470025"/>
+            <a:off x="677946" y="1432318"/>
             <a:ext cx="11109958" cy="4351338"/>
           </a:xfrm>
         </p:spPr>
@@ -13209,7 +13381,11 @@
             </a:r>
             <a:r>
               <a:rPr lang="en-US" sz="2000" dirty="0"/>
-              <a:t> plot and ADF test </a:t>
+              <a:t> plot and </a:t>
+            </a:r>
+            <a:r>
+              <a:rPr lang="en-US" sz="2000" b="1" dirty="0"/>
+              <a:t>ADF test </a:t>
             </a:r>
           </a:p>
           <a:p>
@@ -13269,7 +13445,15 @@
             </a:pPr>
             <a:r>
               <a:rPr lang="en-US" sz="2000" dirty="0"/>
-              <a:t>3. Calculate the residuals (errors).We need to prove that the residuals are a white noise by checking the following 3 conditions</a:t>
+              <a:t>3. Calculate the residuals (errors).We need to prove that the residuals are a </a:t>
+            </a:r>
+            <a:r>
+              <a:rPr lang="en-US" sz="2000" b="1" dirty="0"/>
+              <a:t>white noise </a:t>
+            </a:r>
+            <a:r>
+              <a:rPr lang="en-US" sz="2000" dirty="0"/>
+              <a:t>by checking the following 3 conditions</a:t>
             </a:r>
             <a:r>
               <a:rPr lang="en-US" sz="2000" dirty="0" smtClean="0"/>

</xml_diff>